<commit_message>
Added memoization and bottom up to week 7
</commit_message>
<xml_diff>
--- a/Slides/Week 7 - Dynamic Programming, Floyd Warshall.pptx
+++ b/Slides/Week 7 - Dynamic Programming, Floyd Warshall.pptx
@@ -5,7 +5,7 @@
     <p:sldMasterId id="2147483729" r:id="rId1"/>
   </p:sldMasterIdLst>
   <p:notesMasterIdLst>
-    <p:notesMasterId r:id="rId11"/>
+    <p:notesMasterId r:id="rId13"/>
   </p:notesMasterIdLst>
   <p:sldIdLst>
     <p:sldId id="256" r:id="rId2"/>
@@ -17,6 +17,8 @@
     <p:sldId id="270" r:id="rId8"/>
     <p:sldId id="271" r:id="rId9"/>
     <p:sldId id="272" r:id="rId10"/>
+    <p:sldId id="274" r:id="rId11"/>
+    <p:sldId id="273" r:id="rId12"/>
   </p:sldIdLst>
   <p:sldSz cx="12192000" cy="6858000"/>
   <p:notesSz cx="6858000" cy="9144000"/>
@@ -6388,6 +6390,510 @@
 </p:sld>
 </file>
 
+<file path=ppt/slides/slide10.xml><?xml version="1.0" encoding="utf-8"?>
+<p:sld xmlns:a="http://schemas.openxmlformats.org/drawingml/2006/main" xmlns:r="http://schemas.openxmlformats.org/officeDocument/2006/relationships" xmlns:p="http://schemas.openxmlformats.org/presentationml/2006/main">
+  <p:cSld>
+    <p:spTree>
+      <p:nvGrpSpPr>
+        <p:cNvPr id="1" name=""/>
+        <p:cNvGrpSpPr/>
+        <p:nvPr/>
+      </p:nvGrpSpPr>
+      <p:grpSpPr>
+        <a:xfrm>
+          <a:off x="0" y="0"/>
+          <a:ext cx="0" cy="0"/>
+          <a:chOff x="0" y="0"/>
+          <a:chExt cx="0" cy="0"/>
+        </a:xfrm>
+      </p:grpSpPr>
+      <p:sp>
+        <p:nvSpPr>
+          <p:cNvPr id="2" name="Title 1"/>
+          <p:cNvSpPr>
+            <a:spLocks noGrp="1"/>
+          </p:cNvSpPr>
+          <p:nvPr>
+            <p:ph type="title"/>
+          </p:nvPr>
+        </p:nvSpPr>
+        <p:spPr/>
+        <p:txBody>
+          <a:bodyPr/>
+          <a:lstStyle/>
+          <a:p>
+            <a:r>
+              <a:rPr lang="en-US" dirty="0" smtClean="0"/>
+              <a:t>Fibonacci Sequence</a:t>
+            </a:r>
+            <a:br>
+              <a:rPr lang="en-US" dirty="0" smtClean="0"/>
+            </a:br>
+            <a:r>
+              <a:rPr lang="en-US" sz="2000" dirty="0" err="1" smtClean="0"/>
+              <a:t>Memoization</a:t>
+            </a:r>
+            <a:endParaRPr lang="it-IT" dirty="0"/>
+          </a:p>
+        </p:txBody>
+      </p:sp>
+      <p:sp>
+        <p:nvSpPr>
+          <p:cNvPr id="4" name="Footer Placeholder 3"/>
+          <p:cNvSpPr>
+            <a:spLocks noGrp="1"/>
+          </p:cNvSpPr>
+          <p:nvPr>
+            <p:ph type="ftr" sz="quarter" idx="11"/>
+          </p:nvPr>
+        </p:nvSpPr>
+        <p:spPr/>
+        <p:txBody>
+          <a:bodyPr/>
+          <a:lstStyle/>
+          <a:p>
+            <a:r>
+              <a:rPr lang="en-GB" smtClean="0"/>
+              <a:t>INFDEV016A - G. Costantini</a:t>
+            </a:r>
+            <a:endParaRPr lang="en-GB"/>
+          </a:p>
+        </p:txBody>
+      </p:sp>
+      <p:sp>
+        <p:nvSpPr>
+          <p:cNvPr id="5" name="Content Placeholder 4"/>
+          <p:cNvSpPr>
+            <a:spLocks noGrp="1"/>
+          </p:cNvSpPr>
+          <p:nvPr>
+            <p:ph idx="1"/>
+          </p:nvPr>
+        </p:nvSpPr>
+        <p:spPr/>
+        <p:txBody>
+          <a:bodyPr/>
+          <a:lstStyle/>
+          <a:p>
+            <a:r>
+              <a:rPr lang="en-US" dirty="0" smtClean="0"/>
+              <a:t>We compute the sub-problems just N times.</a:t>
+            </a:r>
+          </a:p>
+          <a:p>
+            <a:r>
+              <a:rPr lang="en-US" dirty="0" smtClean="0"/>
+              <a:t>We use an array with N + 1 elements to store the intermediate results.</a:t>
+            </a:r>
+          </a:p>
+          <a:p>
+            <a:r>
+              <a:rPr lang="en-US" dirty="0" smtClean="0"/>
+              <a:t>Accessing the lookup table requires O(1).</a:t>
+            </a:r>
+          </a:p>
+          <a:p>
+            <a:r>
+              <a:rPr lang="en-US" dirty="0" smtClean="0"/>
+              <a:t>The time complexity is O(N): we compute N times sub-problems that require O(1) time. </a:t>
+            </a:r>
+          </a:p>
+          <a:p>
+            <a:r>
+              <a:rPr lang="en-US" dirty="0" smtClean="0"/>
+              <a:t>The rest requires simply to access the lookup table (constant time).</a:t>
+            </a:r>
+          </a:p>
+          <a:p>
+            <a:r>
+              <a:rPr lang="en-US" dirty="0" smtClean="0"/>
+              <a:t>We use O(N) memory space to save the sub-problems results.</a:t>
+            </a:r>
+          </a:p>
+          <a:p>
+            <a:endParaRPr lang="en-US" dirty="0" smtClean="0"/>
+          </a:p>
+        </p:txBody>
+      </p:sp>
+    </p:spTree>
+    <p:extLst>
+      <p:ext uri="{BB962C8B-B14F-4D97-AF65-F5344CB8AC3E}">
+        <p14:creationId xmlns:p14="http://schemas.microsoft.com/office/powerpoint/2010/main" val="2910739285"/>
+      </p:ext>
+    </p:extLst>
+  </p:cSld>
+  <p:clrMapOvr>
+    <a:masterClrMapping/>
+  </p:clrMapOvr>
+</p:sld>
+</file>
+
+<file path=ppt/slides/slide11.xml><?xml version="1.0" encoding="utf-8"?>
+<p:sld xmlns:a="http://schemas.openxmlformats.org/drawingml/2006/main" xmlns:r="http://schemas.openxmlformats.org/officeDocument/2006/relationships" xmlns:p="http://schemas.openxmlformats.org/presentationml/2006/main">
+  <p:cSld>
+    <p:spTree>
+      <p:nvGrpSpPr>
+        <p:cNvPr id="1" name=""/>
+        <p:cNvGrpSpPr/>
+        <p:nvPr/>
+      </p:nvGrpSpPr>
+      <p:grpSpPr>
+        <a:xfrm>
+          <a:off x="0" y="0"/>
+          <a:ext cx="0" cy="0"/>
+          <a:chOff x="0" y="0"/>
+          <a:chExt cx="0" cy="0"/>
+        </a:xfrm>
+      </p:grpSpPr>
+      <p:sp>
+        <p:nvSpPr>
+          <p:cNvPr id="2" name="Title 1"/>
+          <p:cNvSpPr>
+            <a:spLocks noGrp="1"/>
+          </p:cNvSpPr>
+          <p:nvPr>
+            <p:ph type="title"/>
+          </p:nvPr>
+        </p:nvSpPr>
+        <p:spPr/>
+        <p:txBody>
+          <a:bodyPr/>
+          <a:lstStyle/>
+          <a:p>
+            <a:r>
+              <a:rPr lang="en-US" dirty="0" smtClean="0"/>
+              <a:t>Fibonacci Sequence</a:t>
+            </a:r>
+            <a:br>
+              <a:rPr lang="en-US" dirty="0" smtClean="0"/>
+            </a:br>
+            <a:r>
+              <a:rPr lang="en-US" sz="2000" dirty="0" smtClean="0"/>
+              <a:t>Bottom up algorithm (iterative)</a:t>
+            </a:r>
+            <a:endParaRPr lang="it-IT" dirty="0"/>
+          </a:p>
+        </p:txBody>
+      </p:sp>
+      <p:sp>
+        <p:nvSpPr>
+          <p:cNvPr id="4" name="Footer Placeholder 3"/>
+          <p:cNvSpPr>
+            <a:spLocks noGrp="1"/>
+          </p:cNvSpPr>
+          <p:nvPr>
+            <p:ph type="ftr" sz="quarter" idx="11"/>
+          </p:nvPr>
+        </p:nvSpPr>
+        <p:spPr/>
+        <p:txBody>
+          <a:bodyPr/>
+          <a:lstStyle/>
+          <a:p>
+            <a:r>
+              <a:rPr lang="en-GB" smtClean="0"/>
+              <a:t>INFDEV016A - G. Costantini</a:t>
+            </a:r>
+            <a:endParaRPr lang="en-GB"/>
+          </a:p>
+        </p:txBody>
+      </p:sp>
+      <p:sp>
+        <p:nvSpPr>
+          <p:cNvPr id="5" name="Content Placeholder 4"/>
+          <p:cNvSpPr>
+            <a:spLocks noGrp="1"/>
+          </p:cNvSpPr>
+          <p:nvPr>
+            <p:ph idx="1"/>
+          </p:nvPr>
+        </p:nvSpPr>
+        <p:spPr>
+          <a:xfrm>
+            <a:off x="677334" y="1930401"/>
+            <a:ext cx="8596668" cy="4110962"/>
+          </a:xfrm>
+        </p:spPr>
+        <p:txBody>
+          <a:bodyPr>
+            <a:normAutofit lnSpcReduction="10000"/>
+          </a:bodyPr>
+          <a:lstStyle/>
+          <a:p>
+            <a:r>
+              <a:rPr lang="en-US" dirty="0" smtClean="0"/>
+              <a:t>Exploit the structure of the recursive calls.</a:t>
+            </a:r>
+          </a:p>
+          <a:p>
+            <a:r>
+              <a:rPr lang="en-US" dirty="0" smtClean="0"/>
+              <a:t>Build the result of the computation starting from the base case of the recursion.</a:t>
+            </a:r>
+          </a:p>
+          <a:p>
+            <a:r>
+              <a:rPr lang="en-US" dirty="0" smtClean="0"/>
+              <a:t>At each iteration save the intermediate results to use at the next step.</a:t>
+            </a:r>
+          </a:p>
+          <a:p>
+            <a:r>
+              <a:rPr lang="en-US" dirty="0" smtClean="0"/>
+              <a:t>Same complexity as the recursive version.</a:t>
+            </a:r>
+          </a:p>
+          <a:p>
+            <a:endParaRPr lang="en-US" dirty="0"/>
+          </a:p>
+          <a:p>
+            <a:pPr marL="0" indent="0">
+              <a:buNone/>
+            </a:pPr>
+            <a:r>
+              <a:rPr lang="en-US" dirty="0" smtClean="0">
+                <a:latin typeface="Consolas" panose="020B0609020204030204" pitchFamily="49" charset="0"/>
+                <a:cs typeface="Consolas" panose="020B0609020204030204" pitchFamily="49" charset="0"/>
+              </a:rPr>
+              <a:t>Fibonacci(N)</a:t>
+            </a:r>
+            <a:br>
+              <a:rPr lang="en-US" dirty="0" smtClean="0">
+                <a:latin typeface="Consolas" panose="020B0609020204030204" pitchFamily="49" charset="0"/>
+                <a:cs typeface="Consolas" panose="020B0609020204030204" pitchFamily="49" charset="0"/>
+              </a:rPr>
+            </a:br>
+            <a:r>
+              <a:rPr lang="en-US" dirty="0" err="1" smtClean="0">
+                <a:latin typeface="Consolas" panose="020B0609020204030204" pitchFamily="49" charset="0"/>
+                <a:cs typeface="Consolas" panose="020B0609020204030204" pitchFamily="49" charset="0"/>
+              </a:rPr>
+              <a:t>lookupTable</a:t>
+            </a:r>
+            <a:r>
+              <a:rPr lang="en-US" dirty="0" smtClean="0">
+                <a:latin typeface="Consolas" panose="020B0609020204030204" pitchFamily="49" charset="0"/>
+                <a:cs typeface="Consolas" panose="020B0609020204030204" pitchFamily="49" charset="0"/>
+              </a:rPr>
+              <a:t> = array of N + 1 elements</a:t>
+            </a:r>
+            <a:br>
+              <a:rPr lang="en-US" dirty="0" smtClean="0">
+                <a:latin typeface="Consolas" panose="020B0609020204030204" pitchFamily="49" charset="0"/>
+                <a:cs typeface="Consolas" panose="020B0609020204030204" pitchFamily="49" charset="0"/>
+              </a:rPr>
+            </a:br>
+            <a:r>
+              <a:rPr lang="en-US" dirty="0" err="1" smtClean="0">
+                <a:latin typeface="Consolas" panose="020B0609020204030204" pitchFamily="49" charset="0"/>
+                <a:cs typeface="Consolas" panose="020B0609020204030204" pitchFamily="49" charset="0"/>
+              </a:rPr>
+              <a:t>lookupTable</a:t>
+            </a:r>
+            <a:r>
+              <a:rPr lang="en-US" dirty="0" smtClean="0">
+                <a:latin typeface="Consolas" panose="020B0609020204030204" pitchFamily="49" charset="0"/>
+                <a:cs typeface="Consolas" panose="020B0609020204030204" pitchFamily="49" charset="0"/>
+              </a:rPr>
+              <a:t>[0] = 1</a:t>
+            </a:r>
+            <a:br>
+              <a:rPr lang="en-US" dirty="0" smtClean="0">
+                <a:latin typeface="Consolas" panose="020B0609020204030204" pitchFamily="49" charset="0"/>
+                <a:cs typeface="Consolas" panose="020B0609020204030204" pitchFamily="49" charset="0"/>
+              </a:rPr>
+            </a:br>
+            <a:r>
+              <a:rPr lang="en-US" dirty="0" err="1" smtClean="0">
+                <a:latin typeface="Consolas" panose="020B0609020204030204" pitchFamily="49" charset="0"/>
+                <a:cs typeface="Consolas" panose="020B0609020204030204" pitchFamily="49" charset="0"/>
+              </a:rPr>
+              <a:t>lookupTable</a:t>
+            </a:r>
+            <a:r>
+              <a:rPr lang="en-US" dirty="0" smtClean="0">
+                <a:latin typeface="Consolas" panose="020B0609020204030204" pitchFamily="49" charset="0"/>
+                <a:cs typeface="Consolas" panose="020B0609020204030204" pitchFamily="49" charset="0"/>
+              </a:rPr>
+              <a:t>[1] = 1</a:t>
+            </a:r>
+            <a:r>
+              <a:rPr lang="en-US" dirty="0">
+                <a:latin typeface="Consolas" panose="020B0609020204030204" pitchFamily="49" charset="0"/>
+                <a:cs typeface="Consolas" panose="020B0609020204030204" pitchFamily="49" charset="0"/>
+              </a:rPr>
+              <a:t/>
+            </a:r>
+            <a:br>
+              <a:rPr lang="en-US" dirty="0">
+                <a:latin typeface="Consolas" panose="020B0609020204030204" pitchFamily="49" charset="0"/>
+                <a:cs typeface="Consolas" panose="020B0609020204030204" pitchFamily="49" charset="0"/>
+              </a:rPr>
+            </a:br>
+            <a:r>
+              <a:rPr lang="en-US" dirty="0" smtClean="0">
+                <a:latin typeface="Consolas" panose="020B0609020204030204" pitchFamily="49" charset="0"/>
+                <a:cs typeface="Consolas" panose="020B0609020204030204" pitchFamily="49" charset="0"/>
+              </a:rPr>
+              <a:t>FOR </a:t>
+            </a:r>
+            <a:r>
+              <a:rPr lang="en-US" dirty="0" err="1" smtClean="0">
+                <a:latin typeface="Consolas" panose="020B0609020204030204" pitchFamily="49" charset="0"/>
+                <a:cs typeface="Consolas" panose="020B0609020204030204" pitchFamily="49" charset="0"/>
+              </a:rPr>
+              <a:t>i</a:t>
+            </a:r>
+            <a:r>
+              <a:rPr lang="en-US" dirty="0" smtClean="0">
+                <a:latin typeface="Consolas" panose="020B0609020204030204" pitchFamily="49" charset="0"/>
+                <a:cs typeface="Consolas" panose="020B0609020204030204" pitchFamily="49" charset="0"/>
+              </a:rPr>
+              <a:t> = 2 TO N</a:t>
+            </a:r>
+            <a:r>
+              <a:rPr lang="en-US" dirty="0">
+                <a:latin typeface="Consolas" panose="020B0609020204030204" pitchFamily="49" charset="0"/>
+                <a:cs typeface="Consolas" panose="020B0609020204030204" pitchFamily="49" charset="0"/>
+              </a:rPr>
+              <a:t/>
+            </a:r>
+            <a:br>
+              <a:rPr lang="en-US" dirty="0">
+                <a:latin typeface="Consolas" panose="020B0609020204030204" pitchFamily="49" charset="0"/>
+                <a:cs typeface="Consolas" panose="020B0609020204030204" pitchFamily="49" charset="0"/>
+              </a:rPr>
+            </a:br>
+            <a:r>
+              <a:rPr lang="en-US" dirty="0" smtClean="0">
+                <a:latin typeface="Consolas" panose="020B0609020204030204" pitchFamily="49" charset="0"/>
+                <a:cs typeface="Consolas" panose="020B0609020204030204" pitchFamily="49" charset="0"/>
+              </a:rPr>
+              <a:t>  </a:t>
+            </a:r>
+            <a:r>
+              <a:rPr lang="en-US" dirty="0" err="1" smtClean="0">
+                <a:latin typeface="Consolas" panose="020B0609020204030204" pitchFamily="49" charset="0"/>
+                <a:cs typeface="Consolas" panose="020B0609020204030204" pitchFamily="49" charset="0"/>
+              </a:rPr>
+              <a:t>lookupTable</a:t>
+            </a:r>
+            <a:r>
+              <a:rPr lang="en-US" dirty="0" smtClean="0">
+                <a:latin typeface="Consolas" panose="020B0609020204030204" pitchFamily="49" charset="0"/>
+                <a:cs typeface="Consolas" panose="020B0609020204030204" pitchFamily="49" charset="0"/>
+              </a:rPr>
+              <a:t>[</a:t>
+            </a:r>
+            <a:r>
+              <a:rPr lang="en-US" dirty="0" err="1" smtClean="0">
+                <a:latin typeface="Consolas" panose="020B0609020204030204" pitchFamily="49" charset="0"/>
+                <a:cs typeface="Consolas" panose="020B0609020204030204" pitchFamily="49" charset="0"/>
+              </a:rPr>
+              <a:t>i</a:t>
+            </a:r>
+            <a:r>
+              <a:rPr lang="en-US" dirty="0" smtClean="0">
+                <a:latin typeface="Consolas" panose="020B0609020204030204" pitchFamily="49" charset="0"/>
+                <a:cs typeface="Consolas" panose="020B0609020204030204" pitchFamily="49" charset="0"/>
+              </a:rPr>
+              <a:t>] = </a:t>
+            </a:r>
+            <a:r>
+              <a:rPr lang="en-US" dirty="0" err="1" smtClean="0">
+                <a:latin typeface="Consolas" panose="020B0609020204030204" pitchFamily="49" charset="0"/>
+                <a:cs typeface="Consolas" panose="020B0609020204030204" pitchFamily="49" charset="0"/>
+              </a:rPr>
+              <a:t>lookupTable</a:t>
+            </a:r>
+            <a:r>
+              <a:rPr lang="en-US" dirty="0" smtClean="0">
+                <a:latin typeface="Consolas" panose="020B0609020204030204" pitchFamily="49" charset="0"/>
+                <a:cs typeface="Consolas" panose="020B0609020204030204" pitchFamily="49" charset="0"/>
+              </a:rPr>
+              <a:t>[</a:t>
+            </a:r>
+            <a:r>
+              <a:rPr lang="en-US" dirty="0" err="1" smtClean="0">
+                <a:latin typeface="Consolas" panose="020B0609020204030204" pitchFamily="49" charset="0"/>
+                <a:cs typeface="Consolas" panose="020B0609020204030204" pitchFamily="49" charset="0"/>
+              </a:rPr>
+              <a:t>i</a:t>
+            </a:r>
+            <a:r>
+              <a:rPr lang="en-US" dirty="0" smtClean="0">
+                <a:latin typeface="Consolas" panose="020B0609020204030204" pitchFamily="49" charset="0"/>
+                <a:cs typeface="Consolas" panose="020B0609020204030204" pitchFamily="49" charset="0"/>
+              </a:rPr>
+              <a:t> - 1] + </a:t>
+            </a:r>
+            <a:r>
+              <a:rPr lang="en-US" dirty="0" err="1" smtClean="0">
+                <a:latin typeface="Consolas" panose="020B0609020204030204" pitchFamily="49" charset="0"/>
+                <a:cs typeface="Consolas" panose="020B0609020204030204" pitchFamily="49" charset="0"/>
+              </a:rPr>
+              <a:t>lookupTable</a:t>
+            </a:r>
+            <a:r>
+              <a:rPr lang="en-US" dirty="0" smtClean="0">
+                <a:latin typeface="Consolas" panose="020B0609020204030204" pitchFamily="49" charset="0"/>
+                <a:cs typeface="Consolas" panose="020B0609020204030204" pitchFamily="49" charset="0"/>
+              </a:rPr>
+              <a:t>[</a:t>
+            </a:r>
+            <a:r>
+              <a:rPr lang="en-US" dirty="0" err="1" smtClean="0">
+                <a:latin typeface="Consolas" panose="020B0609020204030204" pitchFamily="49" charset="0"/>
+                <a:cs typeface="Consolas" panose="020B0609020204030204" pitchFamily="49" charset="0"/>
+              </a:rPr>
+              <a:t>i</a:t>
+            </a:r>
+            <a:r>
+              <a:rPr lang="en-US" dirty="0" smtClean="0">
+                <a:latin typeface="Consolas" panose="020B0609020204030204" pitchFamily="49" charset="0"/>
+                <a:cs typeface="Consolas" panose="020B0609020204030204" pitchFamily="49" charset="0"/>
+              </a:rPr>
+              <a:t> - 2]</a:t>
+            </a:r>
+            <a:r>
+              <a:rPr lang="en-US" dirty="0"/>
+              <a:t/>
+            </a:r>
+            <a:br>
+              <a:rPr lang="en-US" dirty="0"/>
+            </a:br>
+            <a:r>
+              <a:rPr lang="en-US" dirty="0" smtClean="0"/>
+              <a:t>return </a:t>
+            </a:r>
+            <a:r>
+              <a:rPr lang="en-US" dirty="0" err="1" smtClean="0"/>
+              <a:t>lookupTable</a:t>
+            </a:r>
+            <a:r>
+              <a:rPr lang="en-US" dirty="0" smtClean="0"/>
+              <a:t>[N]</a:t>
+            </a:r>
+            <a:endParaRPr lang="en-US" dirty="0" smtClean="0">
+              <a:latin typeface="Consolas" panose="020B0609020204030204" pitchFamily="49" charset="0"/>
+              <a:cs typeface="Consolas" panose="020B0609020204030204" pitchFamily="49" charset="0"/>
+            </a:endParaRPr>
+          </a:p>
+        </p:txBody>
+      </p:sp>
+    </p:spTree>
+    <p:extLst>
+      <p:ext uri="{BB962C8B-B14F-4D97-AF65-F5344CB8AC3E}">
+        <p14:creationId xmlns:p14="http://schemas.microsoft.com/office/powerpoint/2010/main" val="2896332294"/>
+      </p:ext>
+    </p:extLst>
+  </p:cSld>
+  <p:clrMapOvr>
+    <a:masterClrMapping/>
+  </p:clrMapOvr>
+</p:sld>
+</file>
+
 <file path=ppt/slides/slide2.xml><?xml version="1.0" encoding="utf-8"?>
 <p:sld xmlns:a="http://schemas.openxmlformats.org/drawingml/2006/main" xmlns:r="http://schemas.openxmlformats.org/officeDocument/2006/relationships" xmlns:p="http://schemas.openxmlformats.org/presentationml/2006/main">
   <p:cSld>
@@ -6882,7 +7388,7 @@
                                 <a:rPr lang="en-US" b="0" i="1" smtClean="0">
                                   <a:latin typeface="Cambria Math" panose="02040503050406030204" pitchFamily="18" charset="0"/>
                                 </a:rPr>
-                                <m:t>=0,1</m:t>
+                                <m:t>=0, 1</m:t>
                               </m:r>
                             </m:e>
                             <m:e>
@@ -9056,6 +9562,126 @@
           </a:fontRef>
         </p:style>
       </p:cxnSp>
+      <mc:AlternateContent xmlns:mc="http://schemas.openxmlformats.org/markup-compatibility/2006">
+        <mc:Choice xmlns:a14="http://schemas.microsoft.com/office/drawing/2010/main" Requires="a14">
+          <p:sp>
+            <p:nvSpPr>
+              <p:cNvPr id="56" name="TextBox 55"/>
+              <p:cNvSpPr txBox="1"/>
+              <p:nvPr/>
+            </p:nvSpPr>
+            <p:spPr>
+              <a:xfrm>
+                <a:off x="4236225" y="5542123"/>
+                <a:ext cx="3042892" cy="369332"/>
+              </a:xfrm>
+              <a:prstGeom prst="rect">
+                <a:avLst/>
+              </a:prstGeom>
+              <a:noFill/>
+            </p:spPr>
+            <p:txBody>
+              <a:bodyPr wrap="square" rtlCol="0">
+                <a:spAutoFit/>
+              </a:bodyPr>
+              <a:lstStyle/>
+              <a:p>
+                <a:pPr algn="ctr"/>
+                <a:r>
+                  <a:rPr lang="en-US" b="0" dirty="0" smtClean="0"/>
+                  <a:t>Complexity = </a:t>
+                </a:r>
+                <a14:m>
+                  <m:oMath xmlns:m="http://schemas.openxmlformats.org/officeDocument/2006/math">
+                    <m:r>
+                      <a:rPr lang="en-US" b="0" i="1" smtClean="0">
+                        <a:latin typeface="Cambria Math" panose="02040503050406030204" pitchFamily="18" charset="0"/>
+                      </a:rPr>
+                      <m:t>𝑂</m:t>
+                    </m:r>
+                    <m:r>
+                      <a:rPr lang="en-US" b="0" i="1" smtClean="0">
+                        <a:latin typeface="Cambria Math" panose="02040503050406030204" pitchFamily="18" charset="0"/>
+                      </a:rPr>
+                      <m:t>(</m:t>
+                    </m:r>
+                    <m:sSup>
+                      <m:sSupPr>
+                        <m:ctrlPr>
+                          <a:rPr lang="en-US" b="0" i="1" smtClean="0">
+                            <a:latin typeface="Cambria Math" panose="02040503050406030204" pitchFamily="18" charset="0"/>
+                          </a:rPr>
+                        </m:ctrlPr>
+                      </m:sSupPr>
+                      <m:e>
+                        <m:r>
+                          <a:rPr lang="en-US" b="0" i="1" smtClean="0">
+                            <a:latin typeface="Cambria Math" panose="02040503050406030204" pitchFamily="18" charset="0"/>
+                          </a:rPr>
+                          <m:t>2</m:t>
+                        </m:r>
+                      </m:e>
+                      <m:sup>
+                        <m:r>
+                          <a:rPr lang="en-US" b="0" i="1" smtClean="0">
+                            <a:latin typeface="Cambria Math" panose="02040503050406030204" pitchFamily="18" charset="0"/>
+                          </a:rPr>
+                          <m:t>𝑛</m:t>
+                        </m:r>
+                      </m:sup>
+                    </m:sSup>
+                    <m:r>
+                      <a:rPr lang="en-US" b="0" i="1" smtClean="0">
+                        <a:latin typeface="Cambria Math" panose="02040503050406030204" pitchFamily="18" charset="0"/>
+                      </a:rPr>
+                      <m:t>)</m:t>
+                    </m:r>
+                  </m:oMath>
+                </a14:m>
+                <a:endParaRPr lang="it-IT" dirty="0"/>
+              </a:p>
+            </p:txBody>
+          </p:sp>
+        </mc:Choice>
+        <mc:Fallback>
+          <p:sp>
+            <p:nvSpPr>
+              <p:cNvPr id="56" name="TextBox 55"/>
+              <p:cNvSpPr txBox="1">
+                <a:spLocks noRot="1" noChangeAspect="1" noMove="1" noResize="1" noEditPoints="1" noAdjustHandles="1" noChangeArrowheads="1" noChangeShapeType="1" noTextEdit="1"/>
+              </p:cNvSpPr>
+              <p:nvPr/>
+            </p:nvSpPr>
+            <p:spPr>
+              <a:xfrm>
+                <a:off x="4236225" y="5542123"/>
+                <a:ext cx="3042892" cy="369332"/>
+              </a:xfrm>
+              <a:prstGeom prst="rect">
+                <a:avLst/>
+              </a:prstGeom>
+              <a:blipFill>
+                <a:blip r:embed="rId2"/>
+                <a:stretch>
+                  <a:fillRect t="-9836" b="-22951"/>
+                </a:stretch>
+              </a:blipFill>
+            </p:spPr>
+            <p:txBody>
+              <a:bodyPr/>
+              <a:lstStyle/>
+              <a:p>
+                <a:r>
+                  <a:rPr lang="it-IT">
+                    <a:noFill/>
+                  </a:rPr>
+                  <a:t> </a:t>
+                </a:r>
+              </a:p>
+            </p:txBody>
+          </p:sp>
+        </mc:Fallback>
+      </mc:AlternateContent>
     </p:spTree>
     <p:extLst>
       <p:ext uri="{BB962C8B-B14F-4D97-AF65-F5344CB8AC3E}">
@@ -9329,7 +9955,7 @@
           <a:p>
             <a:r>
               <a:rPr lang="en-US" dirty="0" smtClean="0"/>
-              <a:t>Before we make a recursive call we check if the result of the sub-problem is in the lookup table.</a:t>
+              <a:t>Before we make a recursive call check the lookup table.</a:t>
             </a:r>
           </a:p>
           <a:p>
@@ -9339,7 +9965,7 @@
             </a:r>
             <a:r>
               <a:rPr lang="en-US" dirty="0" smtClean="0"/>
-              <a:t>make the recursive call and add the result.</a:t>
+              <a:t>make the recursive call.</a:t>
             </a:r>
           </a:p>
           <a:p>
@@ -9351,7 +9977,12 @@
               <a:rPr lang="en-US" dirty="0" smtClean="0"/>
               <a:t>read the result from the table.</a:t>
             </a:r>
-            <a:endParaRPr lang="en-US" b="1" dirty="0" smtClean="0"/>
+          </a:p>
+          <a:p>
+            <a:r>
+              <a:rPr lang="en-US" dirty="0" smtClean="0"/>
+              <a:t>Add the result of the current recursive call to the lookup table.</a:t>
+            </a:r>
           </a:p>
           <a:p>
             <a:endParaRPr lang="en-US" dirty="0" smtClean="0"/>
@@ -9415,8 +10046,8 @@
               <a:t>Memoized</a:t>
             </a:r>
             <a:r>
-              <a:rPr lang="en-US" sz="2000" smtClean="0"/>
-              <a:t> algorithm</a:t>
+              <a:rPr lang="en-US" sz="2000" dirty="0" smtClean="0"/>
+              <a:t> algorithm (recursive)</a:t>
             </a:r>
             <a:endParaRPr lang="it-IT" dirty="0"/>
           </a:p>
@@ -9455,51 +10086,346 @@
             <p:ph idx="1"/>
           </p:nvPr>
         </p:nvSpPr>
-        <p:spPr/>
-        <p:txBody>
-          <a:bodyPr/>
-          <a:lstStyle/>
-          <a:p>
+        <p:spPr>
+          <a:xfrm>
+            <a:off x="755992" y="1780024"/>
+            <a:ext cx="8596668" cy="4411715"/>
+          </a:xfrm>
+        </p:spPr>
+        <p:txBody>
+          <a:bodyPr>
+            <a:normAutofit lnSpcReduction="10000"/>
+          </a:bodyPr>
+          <a:lstStyle/>
+          <a:p>
+            <a:pPr marL="0" indent="0">
+              <a:buNone/>
+            </a:pPr>
+            <a:r>
+              <a:rPr lang="en-US" dirty="0" smtClean="0">
+                <a:latin typeface="Consolas" panose="020B0609020204030204" pitchFamily="49" charset="0"/>
+                <a:cs typeface="Consolas" panose="020B0609020204030204" pitchFamily="49" charset="0"/>
+              </a:rPr>
+              <a:t>Fibonacci(N, </a:t>
+            </a:r>
+            <a:r>
+              <a:rPr lang="en-US" dirty="0" err="1" smtClean="0">
+                <a:latin typeface="Consolas" panose="020B0609020204030204" pitchFamily="49" charset="0"/>
+                <a:cs typeface="Consolas" panose="020B0609020204030204" pitchFamily="49" charset="0"/>
+              </a:rPr>
+              <a:t>lookupTable</a:t>
+            </a:r>
+            <a:r>
+              <a:rPr lang="en-US" dirty="0" smtClean="0">
+                <a:latin typeface="Consolas" panose="020B0609020204030204" pitchFamily="49" charset="0"/>
+                <a:cs typeface="Consolas" panose="020B0609020204030204" pitchFamily="49" charset="0"/>
+              </a:rPr>
+              <a:t>)</a:t>
+            </a:r>
+            <a:r>
+              <a:rPr lang="en-US" dirty="0">
+                <a:latin typeface="Consolas" panose="020B0609020204030204" pitchFamily="49" charset="0"/>
+                <a:cs typeface="Consolas" panose="020B0609020204030204" pitchFamily="49" charset="0"/>
+              </a:rPr>
+              <a:t/>
+            </a:r>
+            <a:br>
+              <a:rPr lang="en-US" dirty="0">
+                <a:latin typeface="Consolas" panose="020B0609020204030204" pitchFamily="49" charset="0"/>
+                <a:cs typeface="Consolas" panose="020B0609020204030204" pitchFamily="49" charset="0"/>
+              </a:rPr>
+            </a:br>
+            <a:r>
+              <a:rPr lang="en-US" dirty="0">
+                <a:latin typeface="Consolas" panose="020B0609020204030204" pitchFamily="49" charset="0"/>
+                <a:cs typeface="Consolas" panose="020B0609020204030204" pitchFamily="49" charset="0"/>
+              </a:rPr>
+              <a:t>IF N = 0 or N = 1</a:t>
+            </a:r>
+            <a:br>
+              <a:rPr lang="en-US" dirty="0">
+                <a:latin typeface="Consolas" panose="020B0609020204030204" pitchFamily="49" charset="0"/>
+                <a:cs typeface="Consolas" panose="020B0609020204030204" pitchFamily="49" charset="0"/>
+              </a:rPr>
+            </a:br>
+            <a:r>
+              <a:rPr lang="en-US" dirty="0">
+                <a:latin typeface="Consolas" panose="020B0609020204030204" pitchFamily="49" charset="0"/>
+                <a:cs typeface="Consolas" panose="020B0609020204030204" pitchFamily="49" charset="0"/>
+              </a:rPr>
+              <a:t>  return 1</a:t>
+            </a:r>
+            <a:br>
+              <a:rPr lang="en-US" dirty="0">
+                <a:latin typeface="Consolas" panose="020B0609020204030204" pitchFamily="49" charset="0"/>
+                <a:cs typeface="Consolas" panose="020B0609020204030204" pitchFamily="49" charset="0"/>
+              </a:rPr>
+            </a:br>
+            <a:r>
+              <a:rPr lang="en-US" dirty="0" smtClean="0">
+                <a:latin typeface="Consolas" panose="020B0609020204030204" pitchFamily="49" charset="0"/>
+                <a:cs typeface="Consolas" panose="020B0609020204030204" pitchFamily="49" charset="0"/>
+              </a:rPr>
+              <a:t>ELSE</a:t>
+            </a:r>
+            <a:br>
+              <a:rPr lang="en-US" dirty="0" smtClean="0">
+                <a:latin typeface="Consolas" panose="020B0609020204030204" pitchFamily="49" charset="0"/>
+                <a:cs typeface="Consolas" panose="020B0609020204030204" pitchFamily="49" charset="0"/>
+              </a:rPr>
+            </a:br>
+            <a:r>
+              <a:rPr lang="en-US" dirty="0" smtClean="0">
+                <a:latin typeface="Consolas" panose="020B0609020204030204" pitchFamily="49" charset="0"/>
+                <a:cs typeface="Consolas" panose="020B0609020204030204" pitchFamily="49" charset="0"/>
+              </a:rPr>
+              <a:t>  f1 = 0</a:t>
+            </a:r>
+            <a:br>
+              <a:rPr lang="en-US" dirty="0" smtClean="0">
+                <a:latin typeface="Consolas" panose="020B0609020204030204" pitchFamily="49" charset="0"/>
+                <a:cs typeface="Consolas" panose="020B0609020204030204" pitchFamily="49" charset="0"/>
+              </a:rPr>
+            </a:br>
+            <a:r>
+              <a:rPr lang="en-US" dirty="0" smtClean="0">
+                <a:latin typeface="Consolas" panose="020B0609020204030204" pitchFamily="49" charset="0"/>
+                <a:cs typeface="Consolas" panose="020B0609020204030204" pitchFamily="49" charset="0"/>
+              </a:rPr>
+              <a:t>  f2 = 0</a:t>
+            </a:r>
+            <a:r>
+              <a:rPr lang="en-US" dirty="0">
+                <a:latin typeface="Consolas" panose="020B0609020204030204" pitchFamily="49" charset="0"/>
+                <a:cs typeface="Consolas" panose="020B0609020204030204" pitchFamily="49" charset="0"/>
+              </a:rPr>
+              <a:t/>
+            </a:r>
+            <a:br>
+              <a:rPr lang="en-US" dirty="0">
+                <a:latin typeface="Consolas" panose="020B0609020204030204" pitchFamily="49" charset="0"/>
+                <a:cs typeface="Consolas" panose="020B0609020204030204" pitchFamily="49" charset="0"/>
+              </a:rPr>
+            </a:br>
+            <a:r>
+              <a:rPr lang="en-US" dirty="0">
+                <a:latin typeface="Consolas" panose="020B0609020204030204" pitchFamily="49" charset="0"/>
+                <a:cs typeface="Consolas" panose="020B0609020204030204" pitchFamily="49" charset="0"/>
+              </a:rPr>
+              <a:t>  </a:t>
+            </a:r>
+            <a:r>
+              <a:rPr lang="en-US" dirty="0" smtClean="0">
+                <a:latin typeface="Consolas" panose="020B0609020204030204" pitchFamily="49" charset="0"/>
+                <a:cs typeface="Consolas" panose="020B0609020204030204" pitchFamily="49" charset="0"/>
+              </a:rPr>
+              <a:t>IF </a:t>
+            </a:r>
+            <a:r>
+              <a:rPr lang="en-US" dirty="0" err="1" smtClean="0">
+                <a:latin typeface="Consolas" panose="020B0609020204030204" pitchFamily="49" charset="0"/>
+                <a:cs typeface="Consolas" panose="020B0609020204030204" pitchFamily="49" charset="0"/>
+              </a:rPr>
+              <a:t>lookupTable</a:t>
+            </a:r>
+            <a:r>
+              <a:rPr lang="en-US" dirty="0" smtClean="0">
+                <a:latin typeface="Consolas" panose="020B0609020204030204" pitchFamily="49" charset="0"/>
+                <a:cs typeface="Consolas" panose="020B0609020204030204" pitchFamily="49" charset="0"/>
+              </a:rPr>
+              <a:t>[N - 1] = -1</a:t>
+            </a:r>
+            <a:r>
+              <a:rPr lang="en-US" dirty="0"/>
+              <a:t/>
+            </a:r>
+            <a:br>
+              <a:rPr lang="en-US" dirty="0"/>
+            </a:br>
             <a:r>
               <a:rPr lang="en-US" dirty="0" smtClean="0"/>
-              <a:t>Save the result of sub-problems into a data structure.</a:t>
-            </a:r>
-          </a:p>
-          <a:p>
+              <a:t>      f1 = Fibonacci(N – 1, </a:t>
+            </a:r>
+            <a:r>
+              <a:rPr lang="en-US" dirty="0" err="1" smtClean="0"/>
+              <a:t>lookupTable</a:t>
+            </a:r>
             <a:r>
               <a:rPr lang="en-US" dirty="0" smtClean="0"/>
-              <a:t>The data structure is called lookup table.</a:t>
-            </a:r>
-          </a:p>
-          <a:p>
+              <a:t>)</a:t>
+            </a:r>
+            <a:r>
+              <a:rPr lang="en-US" dirty="0">
+                <a:latin typeface="Consolas" panose="020B0609020204030204" pitchFamily="49" charset="0"/>
+                <a:cs typeface="Consolas" panose="020B0609020204030204" pitchFamily="49" charset="0"/>
+              </a:rPr>
+              <a:t/>
+            </a:r>
+            <a:br>
+              <a:rPr lang="en-US" dirty="0">
+                <a:latin typeface="Consolas" panose="020B0609020204030204" pitchFamily="49" charset="0"/>
+                <a:cs typeface="Consolas" panose="020B0609020204030204" pitchFamily="49" charset="0"/>
+              </a:rPr>
+            </a:br>
+            <a:r>
+              <a:rPr lang="en-US" dirty="0" smtClean="0">
+                <a:latin typeface="Consolas" panose="020B0609020204030204" pitchFamily="49" charset="0"/>
+                <a:cs typeface="Consolas" panose="020B0609020204030204" pitchFamily="49" charset="0"/>
+              </a:rPr>
+              <a:t>  ELSE</a:t>
+            </a:r>
+            <a:br>
+              <a:rPr lang="en-US" dirty="0" smtClean="0">
+                <a:latin typeface="Consolas" panose="020B0609020204030204" pitchFamily="49" charset="0"/>
+                <a:cs typeface="Consolas" panose="020B0609020204030204" pitchFamily="49" charset="0"/>
+              </a:rPr>
+            </a:br>
+            <a:r>
+              <a:rPr lang="en-US" dirty="0" smtClean="0">
+                <a:latin typeface="Consolas" panose="020B0609020204030204" pitchFamily="49" charset="0"/>
+                <a:cs typeface="Consolas" panose="020B0609020204030204" pitchFamily="49" charset="0"/>
+              </a:rPr>
+              <a:t>   f1 = </a:t>
+            </a:r>
+            <a:r>
+              <a:rPr lang="en-US" dirty="0" err="1" smtClean="0">
+                <a:latin typeface="Consolas" panose="020B0609020204030204" pitchFamily="49" charset="0"/>
+                <a:cs typeface="Consolas" panose="020B0609020204030204" pitchFamily="49" charset="0"/>
+              </a:rPr>
+              <a:t>lookupTable</a:t>
+            </a:r>
+            <a:r>
+              <a:rPr lang="en-US" dirty="0" smtClean="0">
+                <a:latin typeface="Consolas" panose="020B0609020204030204" pitchFamily="49" charset="0"/>
+                <a:cs typeface="Consolas" panose="020B0609020204030204" pitchFamily="49" charset="0"/>
+              </a:rPr>
+              <a:t>[N - 1]</a:t>
+            </a:r>
+            <a:br>
+              <a:rPr lang="en-US" dirty="0" smtClean="0">
+                <a:latin typeface="Consolas" panose="020B0609020204030204" pitchFamily="49" charset="0"/>
+                <a:cs typeface="Consolas" panose="020B0609020204030204" pitchFamily="49" charset="0"/>
+              </a:rPr>
+            </a:br>
+            <a:r>
+              <a:rPr lang="en-US" dirty="0" smtClean="0">
+                <a:latin typeface="Consolas" panose="020B0609020204030204" pitchFamily="49" charset="0"/>
+                <a:cs typeface="Consolas" panose="020B0609020204030204" pitchFamily="49" charset="0"/>
+              </a:rPr>
+              <a:t>  IF </a:t>
+            </a:r>
+            <a:r>
+              <a:rPr lang="en-US" dirty="0" err="1" smtClean="0">
+                <a:latin typeface="Consolas" panose="020B0609020204030204" pitchFamily="49" charset="0"/>
+                <a:cs typeface="Consolas" panose="020B0609020204030204" pitchFamily="49" charset="0"/>
+              </a:rPr>
+              <a:t>lookupTable</a:t>
+            </a:r>
+            <a:r>
+              <a:rPr lang="en-US" dirty="0" smtClean="0">
+                <a:latin typeface="Consolas" panose="020B0609020204030204" pitchFamily="49" charset="0"/>
+                <a:cs typeface="Consolas" panose="020B0609020204030204" pitchFamily="49" charset="0"/>
+              </a:rPr>
+              <a:t>[N - 2] = -1</a:t>
+            </a:r>
+            <a:r>
+              <a:rPr lang="en-US" dirty="0"/>
+              <a:t/>
+            </a:r>
+            <a:br>
+              <a:rPr lang="en-US" dirty="0"/>
+            </a:br>
             <a:r>
               <a:rPr lang="en-US" dirty="0" smtClean="0"/>
-              <a:t>Before we make a recursive call we check if the result of the sub-problem is in the lookup table.</a:t>
-            </a:r>
-          </a:p>
-          <a:p>
-            <a:r>
-              <a:rPr lang="en-US" b="1" dirty="0" smtClean="0"/>
-              <a:t>Missing: </a:t>
+              <a:t>      f2 = Fibonacci(N – 2, </a:t>
+            </a:r>
+            <a:r>
+              <a:rPr lang="en-US" dirty="0" err="1" smtClean="0"/>
+              <a:t>lookupTable</a:t>
             </a:r>
             <a:r>
               <a:rPr lang="en-US" dirty="0" smtClean="0"/>
-              <a:t>make the recursive call and add the result.</a:t>
-            </a:r>
-          </a:p>
-          <a:p>
-            <a:r>
-              <a:rPr lang="en-US" b="1" dirty="0" smtClean="0"/>
-              <a:t>Present: </a:t>
-            </a:r>
-            <a:r>
+              <a:t>)</a:t>
+            </a:r>
+            <a:br>
               <a:rPr lang="en-US" dirty="0" smtClean="0"/>
-              <a:t>read the result from the table.</a:t>
-            </a:r>
-            <a:endParaRPr lang="en-US" b="1" dirty="0" smtClean="0"/>
-          </a:p>
-          <a:p>
-            <a:endParaRPr lang="en-US" dirty="0" smtClean="0"/>
+            </a:br>
+            <a:r>
+              <a:rPr lang="en-US" dirty="0" smtClean="0"/>
+              <a:t>    ELSE</a:t>
+            </a:r>
+            <a:r>
+              <a:rPr lang="en-US" dirty="0">
+                <a:latin typeface="Consolas" panose="020B0609020204030204" pitchFamily="49" charset="0"/>
+                <a:cs typeface="Consolas" panose="020B0609020204030204" pitchFamily="49" charset="0"/>
+              </a:rPr>
+              <a:t/>
+            </a:r>
+            <a:br>
+              <a:rPr lang="en-US" dirty="0">
+                <a:latin typeface="Consolas" panose="020B0609020204030204" pitchFamily="49" charset="0"/>
+                <a:cs typeface="Consolas" panose="020B0609020204030204" pitchFamily="49" charset="0"/>
+              </a:rPr>
+            </a:br>
+            <a:r>
+              <a:rPr lang="en-US" dirty="0" smtClean="0">
+                <a:latin typeface="Consolas" panose="020B0609020204030204" pitchFamily="49" charset="0"/>
+                <a:cs typeface="Consolas" panose="020B0609020204030204" pitchFamily="49" charset="0"/>
+              </a:rPr>
+              <a:t>   f2 = </a:t>
+            </a:r>
+            <a:r>
+              <a:rPr lang="en-US" dirty="0" err="1" smtClean="0">
+                <a:latin typeface="Consolas" panose="020B0609020204030204" pitchFamily="49" charset="0"/>
+                <a:cs typeface="Consolas" panose="020B0609020204030204" pitchFamily="49" charset="0"/>
+              </a:rPr>
+              <a:t>lookupTable</a:t>
+            </a:r>
+            <a:r>
+              <a:rPr lang="en-US" dirty="0" smtClean="0">
+                <a:latin typeface="Consolas" panose="020B0609020204030204" pitchFamily="49" charset="0"/>
+                <a:cs typeface="Consolas" panose="020B0609020204030204" pitchFamily="49" charset="0"/>
+              </a:rPr>
+              <a:t>[N - 2]</a:t>
+            </a:r>
+            <a:r>
+              <a:rPr lang="en-US" dirty="0"/>
+              <a:t/>
+            </a:r>
+            <a:br>
+              <a:rPr lang="en-US" dirty="0"/>
+            </a:br>
+            <a:r>
+              <a:rPr lang="en-US" dirty="0" smtClean="0"/>
+              <a:t>    </a:t>
+            </a:r>
+            <a:r>
+              <a:rPr lang="en-US" dirty="0" err="1" smtClean="0"/>
+              <a:t>lookupTable</a:t>
+            </a:r>
+            <a:r>
+              <a:rPr lang="en-US" dirty="0" smtClean="0"/>
+              <a:t>[N] = f1 + f2</a:t>
+            </a:r>
+            <a:br>
+              <a:rPr lang="en-US" dirty="0" smtClean="0"/>
+            </a:br>
+            <a:r>
+              <a:rPr lang="en-US" dirty="0" smtClean="0"/>
+              <a:t>    return </a:t>
+            </a:r>
+            <a:r>
+              <a:rPr lang="en-US" dirty="0" err="1" smtClean="0"/>
+              <a:t>lookupTable</a:t>
+            </a:r>
+            <a:r>
+              <a:rPr lang="en-US" dirty="0" smtClean="0"/>
+              <a:t>[N]</a:t>
+            </a:r>
+            <a:endParaRPr lang="en-US" dirty="0" smtClean="0">
+              <a:latin typeface="Consolas" panose="020B0609020204030204" pitchFamily="49" charset="0"/>
+              <a:cs typeface="Consolas" panose="020B0609020204030204" pitchFamily="49" charset="0"/>
+            </a:endParaRPr>
           </a:p>
         </p:txBody>
       </p:sp>

</xml_diff>